<commit_message>
- Bậc lại chức năng cập nhật khi sự kiện đang điểm danh, nhưng chỉ cho phép dời thời điểm ra. - Cho phép tô mô từ khóa tìm kiếm ở phần mã thẻ trên giao diện tìm cb, sv.
</commit_message>
<xml_diff>
--- a/Docs/Report/DD_RFID_FinalReport_v1.0.1.pptx
+++ b/Docs/Report/DD_RFID_FinalReport_v1.0.1.pptx
@@ -17,11 +17,11 @@
     <p:sldId id="274" r:id="rId8"/>
     <p:sldId id="275" r:id="rId9"/>
     <p:sldId id="276" r:id="rId10"/>
-    <p:sldId id="297" r:id="rId11"/>
-    <p:sldId id="298" r:id="rId12"/>
-    <p:sldId id="290" r:id="rId13"/>
-    <p:sldId id="291" r:id="rId14"/>
-    <p:sldId id="292" r:id="rId15"/>
+    <p:sldId id="298" r:id="rId11"/>
+    <p:sldId id="290" r:id="rId12"/>
+    <p:sldId id="291" r:id="rId13"/>
+    <p:sldId id="292" r:id="rId14"/>
+    <p:sldId id="297" r:id="rId15"/>
     <p:sldId id="262" r:id="rId16"/>
     <p:sldId id="293" r:id="rId17"/>
   </p:sldIdLst>
@@ -3290,7 +3290,7 @@
           <a:p>
             <a:fld id="{FBA972DB-F795-481F-9DDB-E98EB1FB6476}" type="datetimeFigureOut">
               <a:rPr lang="en-US" smtClean="0"/>
-              <a:t>27-11-17</a:t>
+              <a:t>29-11-17</a:t>
             </a:fld>
             <a:endParaRPr lang="en-US"/>
           </a:p>
@@ -5583,13 +5583,7 @@
       </p:grpSpPr>
       <p:sp>
         <p:nvSpPr>
-          <p:cNvPr id="2" name="Title 1">
-            <a:extLst>
-              <a:ext uri="{FF2B5EF4-FFF2-40B4-BE49-F238E27FC236}">
-                <a16:creationId xmlns:a16="http://schemas.microsoft.com/office/drawing/2014/main" id="{556D9FBF-4C6D-4383-A2C1-D2BB65EB57DF}"/>
-              </a:ext>
-            </a:extLst>
-          </p:cNvPr>
+          <p:cNvPr id="2" name="Title 1"/>
           <p:cNvSpPr>
             <a:spLocks noGrp="1"/>
           </p:cNvSpPr>
@@ -5605,20 +5599,64 @@
             <a:pPr algn="ctr"/>
             <a:r>
               <a:rPr lang="en-US"/>
-              <a:t>DEMO</a:t>
+              <a:t>Phần 3: Tổng kết</a:t>
             </a:r>
           </a:p>
         </p:txBody>
       </p:sp>
       <p:sp>
         <p:nvSpPr>
-          <p:cNvPr id="4" name="Slide Number Placeholder 3">
-            <a:extLst>
-              <a:ext uri="{FF2B5EF4-FFF2-40B4-BE49-F238E27FC236}">
-                <a16:creationId xmlns:a16="http://schemas.microsoft.com/office/drawing/2014/main" id="{1B4DCABB-2336-4539-A514-E0EE7A101BB0}"/>
-              </a:ext>
-            </a:extLst>
-          </p:cNvPr>
+          <p:cNvPr id="3" name="Content Placeholder 2"/>
+          <p:cNvSpPr>
+            <a:spLocks noGrp="1"/>
+          </p:cNvSpPr>
+          <p:nvPr>
+            <p:ph idx="1"/>
+          </p:nvPr>
+        </p:nvSpPr>
+        <p:spPr/>
+        <p:txBody>
+          <a:bodyPr/>
+          <a:lstStyle/>
+          <a:p>
+            <a:r>
+              <a:rPr lang="en-US" sz="2600"/>
+              <a:t>Kết quả đạt đ</a:t>
+            </a:r>
+            <a:r>
+              <a:rPr lang="vi-VN" sz="2600"/>
+              <a:t>ư</a:t>
+            </a:r>
+            <a:r>
+              <a:rPr lang="en-US" sz="2600"/>
+              <a:t>ợc.</a:t>
+            </a:r>
+          </a:p>
+          <a:p>
+            <a:r>
+              <a:rPr lang="en-US" sz="2600"/>
+              <a:t>Hạn chế.</a:t>
+            </a:r>
+          </a:p>
+          <a:p>
+            <a:r>
+              <a:rPr lang="en-US" sz="2600"/>
+              <a:t>H</a:t>
+            </a:r>
+            <a:r>
+              <a:rPr lang="vi-VN" sz="2600"/>
+              <a:t>ư</a:t>
+            </a:r>
+            <a:r>
+              <a:rPr lang="en-US" sz="2600"/>
+              <a:t>ớng phát triển.</a:t>
+            </a:r>
+          </a:p>
+        </p:txBody>
+      </p:sp>
+      <p:sp>
+        <p:nvSpPr>
+          <p:cNvPr id="4" name="Slide Number Placeholder 3"/>
           <p:cNvSpPr>
             <a:spLocks noGrp="1"/>
           </p:cNvSpPr>
@@ -5645,107 +5683,19 @@
           </a:p>
         </p:txBody>
       </p:sp>
-      <p:pic>
-        <p:nvPicPr>
-          <p:cNvPr id="1026" name="Picture 2" descr="Kết quả hình ảnh cho demo">
-            <a:hlinkClick r:id="rId2"/>
-            <a:extLst>
-              <a:ext uri="{FF2B5EF4-FFF2-40B4-BE49-F238E27FC236}">
-                <a16:creationId xmlns:a16="http://schemas.microsoft.com/office/drawing/2014/main" id="{25D2D659-A419-40EF-8409-5CE6E95F583E}"/>
-              </a:ext>
-            </a:extLst>
-          </p:cNvPr>
-          <p:cNvPicPr>
-            <a:picLocks noChangeAspect="1" noChangeArrowheads="1"/>
-          </p:cNvPicPr>
-          <p:nvPr/>
-        </p:nvPicPr>
-        <p:blipFill>
-          <a:blip r:embed="rId3">
-            <a:extLst>
-              <a:ext uri="{BEBA8EAE-BF5A-486C-A8C5-ECC9F3942E4B}">
-                <a14:imgProps xmlns:a14="http://schemas.microsoft.com/office/drawing/2010/main">
-                  <a14:imgLayer r:embed="rId4">
-                    <a14:imgEffect>
-                      <a14:backgroundRemoval t="4667" b="97667" l="3111" r="96444">
-                        <a14:foregroundMark x1="38000" y1="12333" x2="38556" y2="55667"/>
-                        <a14:foregroundMark x1="63222" y1="11889" x2="55444" y2="68111"/>
-                        <a14:foregroundMark x1="79000" y1="22222" x2="90111" y2="51556"/>
-                        <a14:foregroundMark x1="90111" y1="58222" x2="26444" y2="67556"/>
-                        <a14:foregroundMark x1="10444" y1="42111" x2="9889" y2="63778"/>
-                        <a14:foregroundMark x1="14000" y1="67778" x2="31000" y2="85222"/>
-                        <a14:foregroundMark x1="38111" y1="88000" x2="65778" y2="87333"/>
-                        <a14:foregroundMark x1="70222" y1="82667" x2="77111" y2="53889"/>
-                        <a14:foregroundMark x1="24556" y1="75667" x2="26556" y2="74889"/>
-                        <a14:foregroundMark x1="16556" y1="59444" x2="16556" y2="59444"/>
-                        <a14:foregroundMark x1="13444" y1="33444" x2="25111" y2="39778"/>
-                        <a14:foregroundMark x1="17889" y1="21778" x2="34222" y2="35444"/>
-                        <a14:foregroundMark x1="28667" y1="15111" x2="37556" y2="34444"/>
-                        <a14:foregroundMark x1="51667" y1="10444" x2="49222" y2="30222"/>
-                        <a14:foregroundMark x1="89556" y1="44444" x2="79444" y2="46444"/>
-                        <a14:foregroundMark x1="87778" y1="53667" x2="82111" y2="52333"/>
-                        <a14:foregroundMark x1="83667" y1="67889" x2="75444" y2="62222"/>
-                        <a14:foregroundMark x1="78556" y1="75444" x2="76444" y2="68556"/>
-                        <a14:foregroundMark x1="64667" y1="85667" x2="61111" y2="77667"/>
-                        <a14:foregroundMark x1="42778" y1="87333" x2="50000" y2="79778"/>
-                        <a14:foregroundMark x1="30444" y1="81778" x2="41222" y2="75444"/>
-                        <a14:foregroundMark x1="58222" y1="87000" x2="52000" y2="78111"/>
-                        <a14:foregroundMark x1="36444" y1="86444" x2="42444" y2="77333"/>
-                        <a14:foregroundMark x1="17000" y1="69778" x2="35333" y2="65444"/>
-                        <a14:foregroundMark x1="15556" y1="42778" x2="16667" y2="69111"/>
-                        <a14:foregroundMark x1="24556" y1="41222" x2="29667" y2="40000"/>
-                        <a14:foregroundMark x1="32222" y1="48333" x2="33222" y2="57000"/>
-                        <a14:foregroundMark x1="24667" y1="51667" x2="27667" y2="59889"/>
-                        <a14:foregroundMark x1="43111" y1="52333" x2="42889" y2="64000"/>
-                        <a14:foregroundMark x1="56444" y1="38556" x2="44889" y2="60444"/>
-                        <a14:foregroundMark x1="65556" y1="36778" x2="81667" y2="69778"/>
-                        <a14:foregroundMark x1="64667" y1="61778" x2="83222" y2="46000"/>
-                        <a14:foregroundMark x1="59111" y1="47222" x2="63222" y2="56333"/>
-                      </a14:backgroundRemoval>
-                    </a14:imgEffect>
-                  </a14:imgLayer>
-                </a14:imgProps>
-              </a:ext>
-              <a:ext uri="{28A0092B-C50C-407E-A947-70E740481C1C}">
-                <a14:useLocalDpi xmlns:a14="http://schemas.microsoft.com/office/drawing/2010/main" val="0"/>
-              </a:ext>
-            </a:extLst>
-          </a:blip>
-          <a:srcRect/>
-          <a:stretch>
-            <a:fillRect/>
-          </a:stretch>
-        </p:blipFill>
-        <p:spPr bwMode="auto">
-          <a:xfrm>
-            <a:off x="2514600" y="1905000"/>
-            <a:ext cx="4114800" cy="4114800"/>
-          </a:xfrm>
-          <a:prstGeom prst="rect">
-            <a:avLst/>
-          </a:prstGeom>
-          <a:noFill/>
-          <a:extLst>
-            <a:ext uri="{909E8E84-426E-40DD-AFC4-6F175D3DCCD1}">
-              <a14:hiddenFill xmlns:a14="http://schemas.microsoft.com/office/drawing/2010/main">
-                <a:solidFill>
-                  <a:srgbClr val="FFFFFF"/>
-                </a:solidFill>
-              </a14:hiddenFill>
-            </a:ext>
-          </a:extLst>
-        </p:spPr>
-      </p:pic>
     </p:spTree>
     <p:extLst>
       <p:ext uri="{BB962C8B-B14F-4D97-AF65-F5344CB8AC3E}">
-        <p14:creationId xmlns:p14="http://schemas.microsoft.com/office/powerpoint/2010/main" val="3138940505"/>
+        <p14:creationId xmlns:p14="http://schemas.microsoft.com/office/powerpoint/2010/main" val="3134744520"/>
       </p:ext>
     </p:extLst>
   </p:cSld>
   <p:clrMapOvr>
     <a:masterClrMapping/>
   </p:clrMapOvr>
+  <p:transition spd="med">
+    <p:pull/>
+  </p:transition>
 </p:sld>
 </file>
 
@@ -5784,141 +5734,6 @@
             <a:pPr algn="ctr"/>
             <a:r>
               <a:rPr lang="en-US"/>
-              <a:t>Phần 3: Tổng kết</a:t>
-            </a:r>
-          </a:p>
-        </p:txBody>
-      </p:sp>
-      <p:sp>
-        <p:nvSpPr>
-          <p:cNvPr id="3" name="Content Placeholder 2"/>
-          <p:cNvSpPr>
-            <a:spLocks noGrp="1"/>
-          </p:cNvSpPr>
-          <p:nvPr>
-            <p:ph idx="1"/>
-          </p:nvPr>
-        </p:nvSpPr>
-        <p:spPr/>
-        <p:txBody>
-          <a:bodyPr/>
-          <a:lstStyle/>
-          <a:p>
-            <a:r>
-              <a:rPr lang="en-US" sz="2600"/>
-              <a:t>Kết quả đạt đ</a:t>
-            </a:r>
-            <a:r>
-              <a:rPr lang="vi-VN" sz="2600"/>
-              <a:t>ư</a:t>
-            </a:r>
-            <a:r>
-              <a:rPr lang="en-US" sz="2600"/>
-              <a:t>ợc.</a:t>
-            </a:r>
-          </a:p>
-          <a:p>
-            <a:r>
-              <a:rPr lang="en-US" sz="2600"/>
-              <a:t>Hạn chế.</a:t>
-            </a:r>
-          </a:p>
-          <a:p>
-            <a:r>
-              <a:rPr lang="en-US" sz="2600"/>
-              <a:t>H</a:t>
-            </a:r>
-            <a:r>
-              <a:rPr lang="vi-VN" sz="2600"/>
-              <a:t>ư</a:t>
-            </a:r>
-            <a:r>
-              <a:rPr lang="en-US" sz="2600"/>
-              <a:t>ớng phát triển.</a:t>
-            </a:r>
-          </a:p>
-        </p:txBody>
-      </p:sp>
-      <p:sp>
-        <p:nvSpPr>
-          <p:cNvPr id="4" name="Slide Number Placeholder 3"/>
-          <p:cNvSpPr>
-            <a:spLocks noGrp="1"/>
-          </p:cNvSpPr>
-          <p:nvPr>
-            <p:ph type="sldNum" sz="quarter" idx="12"/>
-          </p:nvPr>
-        </p:nvSpPr>
-        <p:spPr/>
-        <p:txBody>
-          <a:bodyPr/>
-          <a:lstStyle/>
-          <a:p>
-            <a:pPr>
-              <a:defRPr/>
-            </a:pPr>
-            <a:fld id="{20CDDA0F-6228-4D21-A34F-D991946E76B9}" type="slidenum">
-              <a:rPr lang="en-US" altLang="en-US" smtClean="0"/>
-              <a:pPr>
-                <a:defRPr/>
-              </a:pPr>
-              <a:t>11</a:t>
-            </a:fld>
-            <a:endParaRPr lang="en-US" altLang="en-US"/>
-          </a:p>
-        </p:txBody>
-      </p:sp>
-    </p:spTree>
-    <p:extLst>
-      <p:ext uri="{BB962C8B-B14F-4D97-AF65-F5344CB8AC3E}">
-        <p14:creationId xmlns:p14="http://schemas.microsoft.com/office/powerpoint/2010/main" val="3134744520"/>
-      </p:ext>
-    </p:extLst>
-  </p:cSld>
-  <p:clrMapOvr>
-    <a:masterClrMapping/>
-  </p:clrMapOvr>
-  <p:transition spd="med">
-    <p:pull/>
-  </p:transition>
-</p:sld>
-</file>
-
-<file path=ppt/slides/slide12.xml><?xml version="1.0" encoding="utf-8"?>
-<p:sld xmlns:a="http://schemas.openxmlformats.org/drawingml/2006/main" xmlns:r="http://schemas.openxmlformats.org/officeDocument/2006/relationships" xmlns:p="http://schemas.openxmlformats.org/presentationml/2006/main">
-  <p:cSld>
-    <p:spTree>
-      <p:nvGrpSpPr>
-        <p:cNvPr id="1" name=""/>
-        <p:cNvGrpSpPr/>
-        <p:nvPr/>
-      </p:nvGrpSpPr>
-      <p:grpSpPr>
-        <a:xfrm>
-          <a:off x="0" y="0"/>
-          <a:ext cx="0" cy="0"/>
-          <a:chOff x="0" y="0"/>
-          <a:chExt cx="0" cy="0"/>
-        </a:xfrm>
-      </p:grpSpPr>
-      <p:sp>
-        <p:nvSpPr>
-          <p:cNvPr id="2" name="Title 1"/>
-          <p:cNvSpPr>
-            <a:spLocks noGrp="1"/>
-          </p:cNvSpPr>
-          <p:nvPr>
-            <p:ph type="title"/>
-          </p:nvPr>
-        </p:nvSpPr>
-        <p:spPr/>
-        <p:txBody>
-          <a:bodyPr/>
-          <a:lstStyle/>
-          <a:p>
-            <a:pPr algn="ctr"/>
-            <a:r>
-              <a:rPr lang="en-US"/>
               <a:t>Kết quả đạt đ</a:t>
             </a:r>
             <a:r>
@@ -5955,7 +5770,7 @@
               <a:pPr>
                 <a:defRPr/>
               </a:pPr>
-              <a:t>12</a:t>
+              <a:t>11</a:t>
             </a:fld>
             <a:endParaRPr lang="en-US" altLang="en-US"/>
           </a:p>
@@ -6300,7 +6115,7 @@
 </p:sld>
 </file>
 
-<file path=ppt/slides/slide13.xml><?xml version="1.0" encoding="utf-8"?>
+<file path=ppt/slides/slide12.xml><?xml version="1.0" encoding="utf-8"?>
 <p:sld xmlns:a="http://schemas.openxmlformats.org/drawingml/2006/main" xmlns:r="http://schemas.openxmlformats.org/officeDocument/2006/relationships" xmlns:p="http://schemas.openxmlformats.org/presentationml/2006/main">
   <p:cSld>
     <p:spTree>
@@ -6368,7 +6183,7 @@
               <a:pPr>
                 <a:defRPr/>
               </a:pPr>
-              <a:t>13</a:t>
+              <a:t>12</a:t>
             </a:fld>
             <a:endParaRPr lang="en-US" altLang="en-US"/>
           </a:p>
@@ -6645,7 +6460,7 @@
 </p:sld>
 </file>
 
-<file path=ppt/slides/slide14.xml><?xml version="1.0" encoding="utf-8"?>
+<file path=ppt/slides/slide13.xml><?xml version="1.0" encoding="utf-8"?>
 <p:sld xmlns:a="http://schemas.openxmlformats.org/drawingml/2006/main" xmlns:r="http://schemas.openxmlformats.org/officeDocument/2006/relationships" xmlns:p="http://schemas.openxmlformats.org/presentationml/2006/main">
   <p:cSld>
     <p:spTree>
@@ -6713,7 +6528,7 @@
               <a:pPr>
                 <a:defRPr/>
               </a:pPr>
-              <a:t>14</a:t>
+              <a:t>13</a:t>
             </a:fld>
             <a:endParaRPr lang="en-US" altLang="en-US"/>
           </a:p>
@@ -6999,6 +6814,191 @@
       </p:par>
     </p:tnLst>
   </p:timing>
+</p:sld>
+</file>
+
+<file path=ppt/slides/slide14.xml><?xml version="1.0" encoding="utf-8"?>
+<p:sld xmlns:a="http://schemas.openxmlformats.org/drawingml/2006/main" xmlns:r="http://schemas.openxmlformats.org/officeDocument/2006/relationships" xmlns:p="http://schemas.openxmlformats.org/presentationml/2006/main">
+  <p:cSld>
+    <p:spTree>
+      <p:nvGrpSpPr>
+        <p:cNvPr id="1" name=""/>
+        <p:cNvGrpSpPr/>
+        <p:nvPr/>
+      </p:nvGrpSpPr>
+      <p:grpSpPr>
+        <a:xfrm>
+          <a:off x="0" y="0"/>
+          <a:ext cx="0" cy="0"/>
+          <a:chOff x="0" y="0"/>
+          <a:chExt cx="0" cy="0"/>
+        </a:xfrm>
+      </p:grpSpPr>
+      <p:sp>
+        <p:nvSpPr>
+          <p:cNvPr id="2" name="Title 1">
+            <a:extLst>
+              <a:ext uri="{FF2B5EF4-FFF2-40B4-BE49-F238E27FC236}">
+                <a16:creationId xmlns:a16="http://schemas.microsoft.com/office/drawing/2014/main" id="{556D9FBF-4C6D-4383-A2C1-D2BB65EB57DF}"/>
+              </a:ext>
+            </a:extLst>
+          </p:cNvPr>
+          <p:cNvSpPr>
+            <a:spLocks noGrp="1"/>
+          </p:cNvSpPr>
+          <p:nvPr>
+            <p:ph type="title"/>
+          </p:nvPr>
+        </p:nvSpPr>
+        <p:spPr/>
+        <p:txBody>
+          <a:bodyPr/>
+          <a:lstStyle/>
+          <a:p>
+            <a:pPr algn="ctr"/>
+            <a:r>
+              <a:rPr lang="en-US"/>
+              <a:t>DEMO</a:t>
+            </a:r>
+          </a:p>
+        </p:txBody>
+      </p:sp>
+      <p:sp>
+        <p:nvSpPr>
+          <p:cNvPr id="4" name="Slide Number Placeholder 3">
+            <a:extLst>
+              <a:ext uri="{FF2B5EF4-FFF2-40B4-BE49-F238E27FC236}">
+                <a16:creationId xmlns:a16="http://schemas.microsoft.com/office/drawing/2014/main" id="{1B4DCABB-2336-4539-A514-E0EE7A101BB0}"/>
+              </a:ext>
+            </a:extLst>
+          </p:cNvPr>
+          <p:cNvSpPr>
+            <a:spLocks noGrp="1"/>
+          </p:cNvSpPr>
+          <p:nvPr>
+            <p:ph type="sldNum" sz="quarter" idx="12"/>
+          </p:nvPr>
+        </p:nvSpPr>
+        <p:spPr/>
+        <p:txBody>
+          <a:bodyPr/>
+          <a:lstStyle/>
+          <a:p>
+            <a:pPr>
+              <a:defRPr/>
+            </a:pPr>
+            <a:fld id="{20CDDA0F-6228-4D21-A34F-D991946E76B9}" type="slidenum">
+              <a:rPr lang="en-US" altLang="en-US" smtClean="0"/>
+              <a:pPr>
+                <a:defRPr/>
+              </a:pPr>
+              <a:t>14</a:t>
+            </a:fld>
+            <a:endParaRPr lang="en-US" altLang="en-US"/>
+          </a:p>
+        </p:txBody>
+      </p:sp>
+      <p:pic>
+        <p:nvPicPr>
+          <p:cNvPr id="1026" name="Picture 2" descr="Kết quả hình ảnh cho demo">
+            <a:hlinkClick r:id="rId2"/>
+            <a:extLst>
+              <a:ext uri="{FF2B5EF4-FFF2-40B4-BE49-F238E27FC236}">
+                <a16:creationId xmlns:a16="http://schemas.microsoft.com/office/drawing/2014/main" id="{25D2D659-A419-40EF-8409-5CE6E95F583E}"/>
+              </a:ext>
+            </a:extLst>
+          </p:cNvPr>
+          <p:cNvPicPr>
+            <a:picLocks noChangeAspect="1" noChangeArrowheads="1"/>
+          </p:cNvPicPr>
+          <p:nvPr/>
+        </p:nvPicPr>
+        <p:blipFill>
+          <a:blip r:embed="rId3">
+            <a:extLst>
+              <a:ext uri="{BEBA8EAE-BF5A-486C-A8C5-ECC9F3942E4B}">
+                <a14:imgProps xmlns:a14="http://schemas.microsoft.com/office/drawing/2010/main">
+                  <a14:imgLayer r:embed="rId4">
+                    <a14:imgEffect>
+                      <a14:backgroundRemoval t="4667" b="97667" l="3111" r="96444">
+                        <a14:foregroundMark x1="38000" y1="12333" x2="38556" y2="55667"/>
+                        <a14:foregroundMark x1="63222" y1="11889" x2="55444" y2="68111"/>
+                        <a14:foregroundMark x1="79000" y1="22222" x2="90111" y2="51556"/>
+                        <a14:foregroundMark x1="90111" y1="58222" x2="26444" y2="67556"/>
+                        <a14:foregroundMark x1="10444" y1="42111" x2="9889" y2="63778"/>
+                        <a14:foregroundMark x1="14000" y1="67778" x2="31000" y2="85222"/>
+                        <a14:foregroundMark x1="38111" y1="88000" x2="65778" y2="87333"/>
+                        <a14:foregroundMark x1="70222" y1="82667" x2="77111" y2="53889"/>
+                        <a14:foregroundMark x1="24556" y1="75667" x2="26556" y2="74889"/>
+                        <a14:foregroundMark x1="16556" y1="59444" x2="16556" y2="59444"/>
+                        <a14:foregroundMark x1="13444" y1="33444" x2="25111" y2="39778"/>
+                        <a14:foregroundMark x1="17889" y1="21778" x2="34222" y2="35444"/>
+                        <a14:foregroundMark x1="28667" y1="15111" x2="37556" y2="34444"/>
+                        <a14:foregroundMark x1="51667" y1="10444" x2="49222" y2="30222"/>
+                        <a14:foregroundMark x1="89556" y1="44444" x2="79444" y2="46444"/>
+                        <a14:foregroundMark x1="87778" y1="53667" x2="82111" y2="52333"/>
+                        <a14:foregroundMark x1="83667" y1="67889" x2="75444" y2="62222"/>
+                        <a14:foregroundMark x1="78556" y1="75444" x2="76444" y2="68556"/>
+                        <a14:foregroundMark x1="64667" y1="85667" x2="61111" y2="77667"/>
+                        <a14:foregroundMark x1="42778" y1="87333" x2="50000" y2="79778"/>
+                        <a14:foregroundMark x1="30444" y1="81778" x2="41222" y2="75444"/>
+                        <a14:foregroundMark x1="58222" y1="87000" x2="52000" y2="78111"/>
+                        <a14:foregroundMark x1="36444" y1="86444" x2="42444" y2="77333"/>
+                        <a14:foregroundMark x1="17000" y1="69778" x2="35333" y2="65444"/>
+                        <a14:foregroundMark x1="15556" y1="42778" x2="16667" y2="69111"/>
+                        <a14:foregroundMark x1="24556" y1="41222" x2="29667" y2="40000"/>
+                        <a14:foregroundMark x1="32222" y1="48333" x2="33222" y2="57000"/>
+                        <a14:foregroundMark x1="24667" y1="51667" x2="27667" y2="59889"/>
+                        <a14:foregroundMark x1="43111" y1="52333" x2="42889" y2="64000"/>
+                        <a14:foregroundMark x1="56444" y1="38556" x2="44889" y2="60444"/>
+                        <a14:foregroundMark x1="65556" y1="36778" x2="81667" y2="69778"/>
+                        <a14:foregroundMark x1="64667" y1="61778" x2="83222" y2="46000"/>
+                        <a14:foregroundMark x1="59111" y1="47222" x2="63222" y2="56333"/>
+                      </a14:backgroundRemoval>
+                    </a14:imgEffect>
+                  </a14:imgLayer>
+                </a14:imgProps>
+              </a:ext>
+              <a:ext uri="{28A0092B-C50C-407E-A947-70E740481C1C}">
+                <a14:useLocalDpi xmlns:a14="http://schemas.microsoft.com/office/drawing/2010/main" val="0"/>
+              </a:ext>
+            </a:extLst>
+          </a:blip>
+          <a:srcRect/>
+          <a:stretch>
+            <a:fillRect/>
+          </a:stretch>
+        </p:blipFill>
+        <p:spPr bwMode="auto">
+          <a:xfrm>
+            <a:off x="2514600" y="1905000"/>
+            <a:ext cx="4114800" cy="4114800"/>
+          </a:xfrm>
+          <a:prstGeom prst="rect">
+            <a:avLst/>
+          </a:prstGeom>
+          <a:noFill/>
+          <a:extLst>
+            <a:ext uri="{909E8E84-426E-40DD-AFC4-6F175D3DCCD1}">
+              <a14:hiddenFill xmlns:a14="http://schemas.microsoft.com/office/drawing/2010/main">
+                <a:solidFill>
+                  <a:srgbClr val="FFFFFF"/>
+                </a:solidFill>
+              </a14:hiddenFill>
+            </a:ext>
+          </a:extLst>
+        </p:spPr>
+      </p:pic>
+    </p:spTree>
+    <p:extLst>
+      <p:ext uri="{BB962C8B-B14F-4D97-AF65-F5344CB8AC3E}">
+        <p14:creationId xmlns:p14="http://schemas.microsoft.com/office/powerpoint/2010/main" val="3138940505"/>
+      </p:ext>
+    </p:extLst>
+  </p:cSld>
+  <p:clrMapOvr>
+    <a:masterClrMapping/>
+  </p:clrMapOvr>
 </p:sld>
 </file>
 
@@ -7913,7 +7913,7 @@
           <a:p>
             <a:r>
               <a:rPr lang="en-US" sz="2600"/>
-              <a:t>Công nghệ rfid định danh đối tượng như RFID lại đang phát triển. Các thẻ RFID đã được trang bị cho cán bộ và sinh viên.</a:t>
+              <a:t>Công nghệ định danh đối tượng như RFID lại đang phát triển. Các thẻ RFID đã được trang bị cho cán bộ và sinh viên.</a:t>
             </a:r>
           </a:p>
           <a:p>

</xml_diff>

<commit_message>
- Thay đổi dòng nhận thẻ được ghi từ client sau khi nhận thẻ ở client.
</commit_message>
<xml_diff>
--- a/Docs/Report/DD_RFID_FinalReport_v1.0.1.pptx
+++ b/Docs/Report/DD_RFID_FinalReport_v1.0.1.pptx
@@ -3290,7 +3290,7 @@
           <a:p>
             <a:fld id="{FBA972DB-F795-481F-9DDB-E98EB1FB6476}" type="datetimeFigureOut">
               <a:rPr lang="en-US" smtClean="0"/>
-              <a:t>29-11-17</a:t>
+              <a:t>30-11-17</a:t>
             </a:fld>
             <a:endParaRPr lang="en-US"/>
           </a:p>
@@ -5810,12 +5810,6 @@
           <a:p>
             <a:r>
               <a:rPr lang="en-US" sz="2700"/>
-              <a:t>Các chức năng hoạt động đúng sau khi đã qua kiểm thử.</a:t>
-            </a:r>
-          </a:p>
-          <a:p>
-            <a:r>
-              <a:rPr lang="en-US" sz="2700"/>
               <a:t>Chức năng điểm danh phản hồi kết quả kịp tốc độ quét thẻ liên tục của đầu đọc.</a:t>
             </a:r>
           </a:p>
@@ -6033,49 +6027,6 @@
                                           <p:spTgt spid="7">
                                             <p:txEl>
                                               <p:pRg st="3" end="3"/>
-                                            </p:txEl>
-                                          </p:spTgt>
-                                        </p:tgtEl>
-                                      </p:cBhvr>
-                                    </p:animEffect>
-                                  </p:childTnLst>
-                                </p:cTn>
-                              </p:par>
-                              <p:par>
-                                <p:cTn id="17" presetID="10" presetClass="entr" presetSubtype="0" fill="hold" nodeType="withEffect">
-                                  <p:stCondLst>
-                                    <p:cond delay="0"/>
-                                  </p:stCondLst>
-                                  <p:childTnLst>
-                                    <p:set>
-                                      <p:cBhvr>
-                                        <p:cTn id="18" dur="1" fill="hold">
-                                          <p:stCondLst>
-                                            <p:cond delay="0"/>
-                                          </p:stCondLst>
-                                        </p:cTn>
-                                        <p:tgtEl>
-                                          <p:spTgt spid="7">
-                                            <p:txEl>
-                                              <p:pRg st="4" end="4"/>
-                                            </p:txEl>
-                                          </p:spTgt>
-                                        </p:tgtEl>
-                                        <p:attrNameLst>
-                                          <p:attrName>style.visibility</p:attrName>
-                                        </p:attrNameLst>
-                                      </p:cBhvr>
-                                      <p:to>
-                                        <p:strVal val="visible"/>
-                                      </p:to>
-                                    </p:set>
-                                    <p:animEffect transition="in" filter="fade">
-                                      <p:cBhvr>
-                                        <p:cTn id="19" dur="500"/>
-                                        <p:tgtEl>
-                                          <p:spTgt spid="7">
-                                            <p:txEl>
-                                              <p:pRg st="4" end="4"/>
                                             </p:txEl>
                                           </p:spTgt>
                                         </p:tgtEl>

</xml_diff>

<commit_message>
- Sửa lỗi chính tả cho lần cuối cho file báo cáo và file trình chiếu
</commit_message>
<xml_diff>
--- a/Docs/Report/DD_RFID_FinalReport_v1.0.1.pptx
+++ b/Docs/Report/DD_RFID_FinalReport_v1.0.1.pptx
@@ -3290,7 +3290,7 @@
           <a:p>
             <a:fld id="{FBA972DB-F795-481F-9DDB-E98EB1FB6476}" type="datetimeFigureOut">
               <a:rPr lang="en-US" smtClean="0"/>
-              <a:t>30-11-17</a:t>
+              <a:t>01-12-17</a:t>
             </a:fld>
             <a:endParaRPr lang="en-US"/>
           </a:p>
@@ -8714,7 +8714,15 @@
             <a:pPr lvl="1"/>
             <a:r>
               <a:rPr lang="vi-VN" sz="2000"/>
-              <a:t>Phương pháp phân tích thiết kế cơ sỡ dữ liệu.</a:t>
+              <a:t>Phương pháp phân tích thiết kế cơ s</a:t>
+            </a:r>
+            <a:r>
+              <a:rPr lang="en-US" sz="2000"/>
+              <a:t>ở</a:t>
+            </a:r>
+            <a:r>
+              <a:rPr lang="vi-VN" sz="2000"/>
+              <a:t> dữ liệu.</a:t>
             </a:r>
           </a:p>
           <a:p>

</xml_diff>

<commit_message>
- Sửa lỗi log nhận không đúng thời gian. - Sửa lỗi thông báo đăng ký thẻ tự động hiển thị khi bắt đầu điểm danh. - Bậc chức năng xem danh sách đăng ký sang trang mới.
</commit_message>
<xml_diff>
--- a/Docs/Report/DD_RFID_FinalReport_v1.0.1.pptx
+++ b/Docs/Report/DD_RFID_FinalReport_v1.0.1.pptx
@@ -6532,8 +6532,12 @@
           </a:p>
           <a:p>
             <a:r>
+              <a:rPr lang="en-US" sz="2000"/>
+              <a:t>T</a:t>
+            </a:r>
+            <a:r>
               <a:rPr lang="vi-VN" sz="2000"/>
-              <a:t>Mở rộng quy mô hệ thống cho nhiều khoa khác, tạo các chức năng quản lý dữ liệu khoa, chuyên ngành, tổ bộ</a:t>
+              <a:t>ạo các chức năng quản lý dữ liệu khoa, chuyên ngành, tổ bộ</a:t>
             </a:r>
             <a:r>
               <a:rPr lang="en-US" sz="2000"/>
@@ -8786,7 +8790,15 @@
             <a:pPr lvl="1"/>
             <a:r>
               <a:rPr lang="vi-VN" sz="2000"/>
-              <a:t>Sử dụng và phát triển web với Laravel Framework, bắt và xử lý sự kiện countdown jquery.</a:t>
+              <a:t>Sử dụng và phát triển web với Laravel Framework, bắt và xử lý sự kiện jquery</a:t>
+            </a:r>
+            <a:r>
+              <a:rPr lang="en-US" sz="2000"/>
+              <a:t> coundown</a:t>
+            </a:r>
+            <a:r>
+              <a:rPr lang="vi-VN" sz="2000"/>
+              <a:t>.</a:t>
             </a:r>
             <a:endParaRPr lang="en-US" sz="2000"/>
           </a:p>

</xml_diff>